<commit_message>
TOM 12 überarbeitet wegen Promotion
</commit_message>
<xml_diff>
--- a/training-cards/music moves/Tomatoes (TOM)/ger/apprentice/ger_TOM_12_Was_passt_in_eine_Tomate_MM_A.pptx
+++ b/training-cards/music moves/Tomatoes (TOM)/ger/apprentice/ger_TOM_12_Was_passt_in_eine_Tomate_MM_A.pptx
@@ -166,7 +166,7 @@
           </a:lstStyle>
           <a:p>
             <a:r>
-              <a:rPr lang="de-DE" smtClean="0"/>
+              <a:rPr lang="de-DE"/>
               <a:t>Mastertitelformat bearbeiten</a:t>
             </a:r>
             <a:endParaRPr lang="de-DE" dirty="0"/>
@@ -287,7 +287,7 @@
           </a:lstStyle>
           <a:p>
             <a:r>
-              <a:rPr lang="de-DE" smtClean="0"/>
+              <a:rPr lang="de-DE"/>
               <a:t>Master-Untertitelformat bearbeiten</a:t>
             </a:r>
             <a:endParaRPr lang="de-DE" dirty="0"/>
@@ -321,35 +321,35 @@
           <a:p>
             <a:pPr lvl="0"/>
             <a:r>
-              <a:rPr lang="de-DE" smtClean="0"/>
+              <a:rPr lang="de-DE"/>
               <a:t>Mastertextformat bearbeiten</a:t>
             </a:r>
           </a:p>
           <a:p>
             <a:pPr lvl="1"/>
             <a:r>
-              <a:rPr lang="de-DE" smtClean="0"/>
+              <a:rPr lang="de-DE"/>
               <a:t>Zweite Ebene</a:t>
             </a:r>
           </a:p>
           <a:p>
             <a:pPr lvl="2"/>
             <a:r>
-              <a:rPr lang="de-DE" smtClean="0"/>
+              <a:rPr lang="de-DE"/>
               <a:t>Dritte Ebene</a:t>
             </a:r>
           </a:p>
           <a:p>
             <a:pPr lvl="3"/>
             <a:r>
-              <a:rPr lang="de-DE" smtClean="0"/>
+              <a:rPr lang="de-DE"/>
               <a:t>Vierte Ebene</a:t>
             </a:r>
           </a:p>
           <a:p>
             <a:pPr lvl="4"/>
             <a:r>
-              <a:rPr lang="de-DE" smtClean="0"/>
+              <a:rPr lang="de-DE"/>
               <a:t>Fünfte Ebene</a:t>
             </a:r>
             <a:endParaRPr lang="de-DE" dirty="0"/>
@@ -397,7 +397,7 @@
           <a:p>
             <a:pPr algn="l"/>
             <a:r>
-              <a:rPr lang="de-DE" sz="1000" dirty="0" smtClean="0">
+              <a:rPr lang="de-DE" sz="1000" dirty="0">
                 <a:solidFill>
                   <a:srgbClr val="5D5E5F"/>
                 </a:solidFill>
@@ -407,7 +407,7 @@
               <a:t>REGINA</a:t>
             </a:r>
             <a:r>
-              <a:rPr lang="de-DE" sz="1000" baseline="0" dirty="0" smtClean="0">
+              <a:rPr lang="de-DE" sz="1000" baseline="0" dirty="0">
                 <a:solidFill>
                   <a:srgbClr val="5D5E5F"/>
                 </a:solidFill>
@@ -417,7 +417,7 @@
               <a:t> BRANDHUBER</a:t>
             </a:r>
             <a:r>
-              <a:rPr lang="de-DE" sz="1000" dirty="0" smtClean="0">
+              <a:rPr lang="de-DE" sz="1000" dirty="0">
                 <a:solidFill>
                   <a:srgbClr val="5D5E5F"/>
                 </a:solidFill>
@@ -426,13 +426,6 @@
               </a:rPr>
               <a:t> </a:t>
             </a:r>
-            <a:endParaRPr lang="de-DE" sz="1000" dirty="0">
-              <a:solidFill>
-                <a:srgbClr val="5D5E5F"/>
-              </a:solidFill>
-              <a:latin typeface="Avenir Book"/>
-              <a:cs typeface="Avenir Book"/>
-            </a:endParaRPr>
           </a:p>
         </p:txBody>
       </p:sp>
@@ -545,35 +538,35 @@
           <a:p>
             <a:pPr lvl="0"/>
             <a:r>
-              <a:rPr lang="de-DE" smtClean="0"/>
+              <a:rPr lang="de-DE"/>
               <a:t>Mastertextformat bearbeiten</a:t>
             </a:r>
           </a:p>
           <a:p>
             <a:pPr lvl="1"/>
             <a:r>
-              <a:rPr lang="de-DE" smtClean="0"/>
+              <a:rPr lang="de-DE"/>
               <a:t>Zweite Ebene</a:t>
             </a:r>
           </a:p>
           <a:p>
             <a:pPr lvl="2"/>
             <a:r>
-              <a:rPr lang="de-DE" smtClean="0"/>
+              <a:rPr lang="de-DE"/>
               <a:t>Dritte Ebene</a:t>
             </a:r>
           </a:p>
           <a:p>
             <a:pPr lvl="3"/>
             <a:r>
-              <a:rPr lang="de-DE" smtClean="0"/>
+              <a:rPr lang="de-DE"/>
               <a:t>Vierte Ebene</a:t>
             </a:r>
           </a:p>
           <a:p>
             <a:pPr lvl="4"/>
             <a:r>
-              <a:rPr lang="de-DE" smtClean="0"/>
+              <a:rPr lang="de-DE"/>
               <a:t>Fünfte Ebene</a:t>
             </a:r>
             <a:endParaRPr lang="de-DE" dirty="0"/>
@@ -603,7 +596,7 @@
           <a:lstStyle/>
           <a:p>
             <a:r>
-              <a:rPr lang="de-DE" sz="2400" dirty="0" smtClean="0">
+              <a:rPr lang="de-DE" sz="2400" dirty="0">
                 <a:solidFill>
                   <a:srgbClr val="7E006B"/>
                 </a:solidFill>
@@ -613,7 +606,7 @@
               <a:t>TR	AININGS</a:t>
             </a:r>
             <a:r>
-              <a:rPr lang="de-DE" sz="2400" dirty="0" smtClean="0">
+              <a:rPr lang="de-DE" sz="2400" dirty="0">
                 <a:solidFill>
                   <a:srgbClr val="7E006B"/>
                 </a:solidFill>
@@ -708,10 +701,9 @@
           <a:lstStyle/>
           <a:p>
             <a:r>
-              <a:rPr lang="de-DE" smtClean="0"/>
+              <a:rPr lang="de-DE"/>
               <a:t>Mastertitelformat bearbeiten</a:t>
             </a:r>
-            <a:endParaRPr lang="de-DE"/>
           </a:p>
         </p:txBody>
       </p:sp>
@@ -732,7 +724,7 @@
           <a:p>
             <a:fld id="{FF5B2BAF-DF38-0A48-A798-0C06E514FD52}" type="datetimeFigureOut">
               <a:rPr lang="de-DE" smtClean="0"/>
-              <a:t>01.03.16</a:t>
+              <a:t>22.07.23</a:t>
             </a:fld>
             <a:endParaRPr lang="de-DE" dirty="0"/>
           </a:p>
@@ -843,10 +835,9 @@
           <a:p>
             <a:pPr marL="0" lvl="0" algn="l"/>
             <a:r>
-              <a:rPr lang="de-DE" dirty="0" smtClean="0"/>
+              <a:rPr lang="de-DE" dirty="0"/>
               <a:t>Überschrift bearbeiten </a:t>
             </a:r>
-            <a:endParaRPr lang="de-DE" dirty="0"/>
           </a:p>
         </p:txBody>
       </p:sp>
@@ -877,38 +868,37 @@
           <a:p>
             <a:pPr lvl="0"/>
             <a:r>
-              <a:rPr lang="de-DE" dirty="0" smtClean="0"/>
+              <a:rPr lang="de-DE" dirty="0"/>
               <a:t>Mastertextformat bearbeiten</a:t>
             </a:r>
           </a:p>
           <a:p>
             <a:pPr lvl="1"/>
             <a:r>
-              <a:rPr lang="de-DE" dirty="0" smtClean="0"/>
+              <a:rPr lang="de-DE" dirty="0"/>
               <a:t>Zweite Ebene</a:t>
             </a:r>
           </a:p>
           <a:p>
             <a:pPr lvl="2"/>
             <a:r>
-              <a:rPr lang="de-DE" dirty="0" smtClean="0"/>
+              <a:rPr lang="de-DE" dirty="0"/>
               <a:t>Dritte Ebene</a:t>
             </a:r>
           </a:p>
           <a:p>
             <a:pPr lvl="3"/>
             <a:r>
-              <a:rPr lang="de-DE" dirty="0" smtClean="0"/>
+              <a:rPr lang="de-DE" dirty="0"/>
               <a:t>Vierte Ebene</a:t>
             </a:r>
           </a:p>
           <a:p>
             <a:pPr lvl="4"/>
             <a:r>
-              <a:rPr lang="de-DE" dirty="0" smtClean="0"/>
+              <a:rPr lang="de-DE" dirty="0"/>
               <a:t>Fünfte Ebene</a:t>
             </a:r>
-            <a:endParaRPr lang="de-DE" dirty="0"/>
           </a:p>
         </p:txBody>
       </p:sp>
@@ -947,7 +937,7 @@
           <a:p>
             <a:fld id="{FF5B2BAF-DF38-0A48-A798-0C06E514FD52}" type="datetimeFigureOut">
               <a:rPr lang="de-DE" smtClean="0"/>
-              <a:t>01.03.16</a:t>
+              <a:t>22.07.23</a:t>
             </a:fld>
             <a:endParaRPr lang="de-DE" dirty="0"/>
           </a:p>
@@ -1181,7 +1171,7 @@
           <a:lstStyle/>
           <a:p>
             <a:r>
-              <a:rPr lang="de-DE" sz="1050" b="1" dirty="0" smtClean="0">
+              <a:rPr lang="de-DE" sz="1050" b="1" dirty="0">
                 <a:solidFill>
                   <a:schemeClr val="bg1"/>
                 </a:solidFill>
@@ -1191,7 +1181,7 @@
               <a:t>TRAININGSKARTE</a:t>
             </a:r>
             <a:r>
-              <a:rPr lang="de-DE" sz="1050" dirty="0" smtClean="0">
+              <a:rPr lang="de-DE" sz="1050" dirty="0">
                 <a:solidFill>
                   <a:schemeClr val="bg1"/>
                 </a:solidFill>
@@ -1201,7 +1191,7 @@
               <a:t> </a:t>
             </a:r>
             <a:r>
-              <a:rPr lang="de-DE" sz="1050" b="1" dirty="0" smtClean="0">
+              <a:rPr lang="de-DE" sz="1050" b="1" dirty="0">
                 <a:solidFill>
                   <a:schemeClr val="bg1"/>
                 </a:solidFill>
@@ -1210,13 +1200,6 @@
               </a:rPr>
               <a:t>TOM 12</a:t>
             </a:r>
-            <a:endParaRPr lang="de-DE" sz="1050" b="1" dirty="0">
-              <a:solidFill>
-                <a:schemeClr val="bg1"/>
-              </a:solidFill>
-              <a:latin typeface="Avenir Heavy"/>
-              <a:cs typeface="Avenir Heavy"/>
-            </a:endParaRPr>
           </a:p>
         </p:txBody>
       </p:sp>
@@ -1599,20 +1582,16 @@
           <a:lstStyle/>
           <a:p>
             <a:r>
-              <a:rPr lang="de-DE" dirty="0" smtClean="0"/>
+              <a:rPr lang="de-DE" dirty="0"/>
               <a:t>WAS PASST </a:t>
             </a:r>
             <a:r>
-              <a:rPr lang="de-DE" dirty="0" smtClean="0">
+              <a:rPr lang="de-DE" dirty="0">
                 <a:latin typeface="Avenir Light"/>
                 <a:cs typeface="Avenir Light"/>
               </a:rPr>
               <a:t>IN EINE TOMATE?</a:t>
             </a:r>
-            <a:endParaRPr lang="de-DE" dirty="0">
-              <a:latin typeface="Avenir Light"/>
-              <a:cs typeface="Avenir Light"/>
-            </a:endParaRPr>
           </a:p>
         </p:txBody>
       </p:sp>
@@ -1642,40 +1621,8 @@
               </a:spcBef>
             </a:pPr>
             <a:r>
-              <a:rPr lang="de-DE" sz="1100" dirty="0" smtClean="0"/>
-              <a:t>Ein erfolgreicher Zeitmanager weiß, </a:t>
-            </a:r>
-            <a:r>
-              <a:rPr lang="de-DE" sz="1100" dirty="0" smtClean="0"/>
-              <a:t>was </a:t>
-            </a:r>
-            <a:r>
-              <a:rPr lang="de-DE" sz="1100" dirty="0" smtClean="0"/>
-              <a:t>er</a:t>
-            </a:r>
-            <a:r>
-              <a:rPr lang="de-DE" sz="1100" dirty="0" smtClean="0"/>
-              <a:t> </a:t>
-            </a:r>
-            <a:r>
-              <a:rPr lang="de-DE" sz="1100" dirty="0" smtClean="0"/>
-              <a:t>den ganzen Tag </a:t>
-            </a:r>
-            <a:r>
-              <a:rPr lang="de-DE" sz="1100" dirty="0" smtClean="0"/>
-              <a:t>tut </a:t>
-            </a:r>
-            <a:r>
-              <a:rPr lang="de-DE" sz="1100" dirty="0" smtClean="0"/>
-              <a:t>und wieviel Zeit </a:t>
-            </a:r>
-            <a:r>
-              <a:rPr lang="de-DE" sz="1100" dirty="0" smtClean="0"/>
-              <a:t>es genau </a:t>
-            </a:r>
-            <a:r>
-              <a:rPr lang="de-DE" sz="1100" dirty="0" smtClean="0"/>
-              <a:t>kostet.</a:t>
+              <a:rPr lang="de-DE" sz="1100" dirty="0"/>
+              <a:t>Ein erfolgreicher Zeitmanager weiß, was er den ganzen Tag tut und wieviel Zeit es genau kostet.</a:t>
             </a:r>
           </a:p>
           <a:p>
@@ -1688,44 +1635,8 @@
               </a:spcBef>
             </a:pPr>
             <a:r>
-              <a:rPr lang="de-DE" sz="1100" smtClean="0"/>
-              <a:t>Wenn Du beginnst </a:t>
-            </a:r>
-            <a:r>
-              <a:rPr lang="de-DE" sz="1100" dirty="0" smtClean="0"/>
-              <a:t>mit</a:t>
-            </a:r>
-            <a:r>
-              <a:rPr lang="de-DE" sz="1100" dirty="0" smtClean="0"/>
-              <a:t> konkreten Zeitfenstern </a:t>
-            </a:r>
-            <a:r>
-              <a:rPr lang="de-DE" sz="1100" smtClean="0"/>
-              <a:t>zu </a:t>
-            </a:r>
-            <a:r>
-              <a:rPr lang="de-DE" sz="1100" smtClean="0"/>
-              <a:t>arbeiten, kannst </a:t>
-            </a:r>
-            <a:r>
-              <a:rPr lang="de-DE" sz="1100" dirty="0" smtClean="0"/>
-              <a:t>Du Deine Wahrnehmung schulen</a:t>
-            </a:r>
-            <a:r>
-              <a:rPr lang="de-DE" sz="1100" dirty="0" smtClean="0"/>
-              <a:t>, </a:t>
-            </a:r>
-            <a:r>
-              <a:rPr lang="de-DE" sz="1100" dirty="0" smtClean="0"/>
-              <a:t>was Du in </a:t>
-            </a:r>
-            <a:r>
-              <a:rPr lang="de-DE" sz="1100" dirty="0" smtClean="0"/>
-              <a:t>einer bestimmten </a:t>
-            </a:r>
-            <a:r>
-              <a:rPr lang="de-DE" sz="1100" dirty="0" smtClean="0"/>
-              <a:t>Zeit alles schaffen kannst.</a:t>
+              <a:rPr lang="de-DE" sz="1100" dirty="0"/>
+              <a:t>Wenn Du beginnst mit konkreten Zeitfenstern zu arbeiten, kannst Du Deine Wahrnehmung schulen, was Du in einer bestimmten Zeit alles schaffen kannst.</a:t>
             </a:r>
           </a:p>
           <a:p>
@@ -1738,12 +1649,8 @@
               </a:spcBef>
             </a:pPr>
             <a:r>
-              <a:rPr lang="de-DE" sz="1100" dirty="0" smtClean="0"/>
-              <a:t>Einen</a:t>
-            </a:r>
-            <a:r>
               <a:rPr lang="de-DE" sz="1100" dirty="0"/>
-              <a:t> </a:t>
+              <a:t>Einen </a:t>
             </a:r>
             <a:r>
               <a:rPr lang="de-DE" sz="1100" dirty="0" err="1"/>
@@ -1751,35 +1658,7 @@
             </a:r>
             <a:r>
               <a:rPr lang="de-DE" sz="1100" dirty="0"/>
-              <a:t> </a:t>
-            </a:r>
-            <a:r>
-              <a:rPr lang="de-DE" sz="1100" dirty="0" smtClean="0"/>
-              <a:t>zu stellen, </a:t>
-            </a:r>
-            <a:r>
-              <a:rPr lang="de-DE" sz="1100" dirty="0"/>
-              <a:t>der </a:t>
-            </a:r>
-            <a:r>
-              <a:rPr lang="de-DE" sz="1100" dirty="0" smtClean="0"/>
-              <a:t>Dir </a:t>
-            </a:r>
-            <a:r>
-              <a:rPr lang="de-DE" sz="1100" dirty="0"/>
-              <a:t>ein Signal gibt, </a:t>
-            </a:r>
-            <a:r>
-              <a:rPr lang="de-DE" sz="1100" dirty="0" smtClean="0"/>
-              <a:t>wann Dein Zeitfenster </a:t>
-            </a:r>
-            <a:r>
-              <a:rPr lang="de-DE" sz="1100" dirty="0"/>
-              <a:t>vorüber ist</a:t>
-            </a:r>
-            <a:r>
-              <a:rPr lang="de-DE" sz="1100" dirty="0" smtClean="0"/>
-              <a:t>, hilft Dein Training messbar zu machen.</a:t>
+              <a:t> zu stellen, der Dir ein Signal gibt, wann Dein Zeitfenster vorüber ist, hilft Dein Training messbar zu machen.</a:t>
             </a:r>
           </a:p>
           <a:p>
@@ -1791,27 +1670,7 @@
           <a:p>
             <a:r>
               <a:rPr lang="de-DE" sz="1100" dirty="0"/>
-              <a:t>Es geht </a:t>
-            </a:r>
-            <a:r>
-              <a:rPr lang="de-DE" sz="1100" dirty="0" smtClean="0"/>
-              <a:t>dabei</a:t>
-            </a:r>
-            <a:r>
-              <a:rPr lang="de-DE" sz="1100" dirty="0" smtClean="0"/>
-              <a:t> </a:t>
-            </a:r>
-            <a:r>
-              <a:rPr lang="de-DE" sz="1100" dirty="0"/>
-              <a:t>nicht darum, so schnell wie möglich zu </a:t>
-            </a:r>
-            <a:r>
-              <a:rPr lang="de-DE" sz="1100" dirty="0" smtClean="0"/>
-              <a:t>arbeiten bist der Wecker klingelt, </a:t>
-            </a:r>
-            <a:r>
-              <a:rPr lang="de-DE" sz="1100" dirty="0"/>
-              <a:t>sondern herauszufinden, was Du alles in einem bequemen Tempo schaffen kannst.</a:t>
+              <a:t>Es geht dabei nicht darum, so schnell wie möglich zu arbeiten bist der Wecker klingelt, sondern herauszufinden, was Du alles in einem bequemen Tempo schaffen kannst.</a:t>
             </a:r>
           </a:p>
           <a:p>
@@ -1833,23 +1692,23 @@
             </a:r>
             <a:r>
               <a:rPr lang="de-DE" sz="1100" dirty="0"/>
-              <a:t> </a:t>
-            </a:r>
-            <a:r>
-              <a:rPr lang="de-DE" sz="1100" dirty="0" smtClean="0"/>
-              <a:t>Technique®</a:t>
-            </a:r>
-            <a:r>
-              <a:rPr lang="de-DE" sz="1100" baseline="30000" dirty="0"/>
+              <a:t> Technique</a:t>
+            </a:r>
+            <a:r>
+              <a:rPr lang="de-DE" sz="1100"/>
+              <a:t>®</a:t>
+            </a:r>
+            <a:r>
+              <a:rPr lang="de-DE" sz="1100" baseline="30000"/>
               <a:t>1</a:t>
             </a:r>
             <a:r>
+              <a:rPr lang="de-DE" sz="1100"/>
+              <a:t>, nennt </a:t>
+            </a:r>
+            <a:r>
               <a:rPr lang="de-DE" sz="1100" dirty="0"/>
-              <a:t> , </a:t>
-            </a:r>
-            <a:r>
-              <a:rPr lang="de-DE" sz="1100" dirty="0"/>
-              <a:t>nennt diese Zeitfenster „Tomaten“. Dabei geht er von 25 Minuten aus, denen eine 5 minütige Pause folgt.</a:t>
+              <a:t>diese Zeitfenster „Tomaten“. Dabei geht er von 25 Minuten aus, denen eine 5 minütige Pause folgt.</a:t>
             </a:r>
           </a:p>
         </p:txBody>
@@ -1877,7 +1736,7 @@
           <a:lstStyle/>
           <a:p>
             <a:r>
-              <a:rPr lang="de-DE" sz="800" dirty="0" err="1" smtClean="0">
+              <a:rPr lang="de-DE" sz="800" dirty="0" err="1">
                 <a:solidFill>
                   <a:srgbClr val="5D5E5F"/>
                 </a:solidFill>
@@ -1887,7 +1746,7 @@
               <a:t>www.pomodorotechnique.com</a:t>
             </a:r>
             <a:r>
-              <a:rPr lang="de-DE" sz="800" dirty="0" smtClean="0">
+              <a:rPr lang="de-DE" sz="800" dirty="0">
                 <a:solidFill>
                   <a:srgbClr val="5D5E5F"/>
                 </a:solidFill>
@@ -1896,13 +1755,6 @@
               </a:rPr>
               <a:t> </a:t>
             </a:r>
-            <a:endParaRPr lang="de-DE" sz="800" dirty="0">
-              <a:solidFill>
-                <a:srgbClr val="5D5E5F"/>
-              </a:solidFill>
-              <a:latin typeface="Avenir Light"/>
-              <a:cs typeface="Avenir Light"/>
-            </a:endParaRPr>
           </a:p>
           <a:p>
             <a:endParaRPr lang="de-DE" sz="800" dirty="0">
@@ -1935,7 +1787,7 @@
           <a:lstStyle/>
           <a:p>
             <a:r>
-              <a:rPr lang="de-DE" sz="500" dirty="0" smtClean="0">
+              <a:rPr lang="de-DE" sz="500" dirty="0">
                 <a:solidFill>
                   <a:schemeClr val="bg1">
                     <a:lumMod val="50000"/>
@@ -1946,15 +1798,6 @@
               </a:rPr>
               <a:t>1</a:t>
             </a:r>
-            <a:endParaRPr lang="de-DE" sz="500" dirty="0">
-              <a:solidFill>
-                <a:schemeClr val="bg1">
-                  <a:lumMod val="50000"/>
-                </a:schemeClr>
-              </a:solidFill>
-              <a:latin typeface="Avenir Book"/>
-              <a:cs typeface="Avenir Book"/>
-            </a:endParaRPr>
           </a:p>
         </p:txBody>
       </p:sp>
@@ -2006,70 +1849,61 @@
           <a:lstStyle/>
           <a:p>
             <a:r>
-              <a:rPr lang="de-DE" sz="1100" dirty="0" smtClean="0"/>
+              <a:rPr lang="de-DE" sz="1100" dirty="0"/>
               <a:t>Nimm Dir für den Anfang die von Francesco </a:t>
             </a:r>
             <a:r>
-              <a:rPr lang="de-DE" sz="1100" dirty="0" err="1" smtClean="0"/>
+              <a:rPr lang="de-DE" sz="1100" dirty="0" err="1"/>
               <a:t>Cirillio</a:t>
             </a:r>
             <a:r>
-              <a:rPr lang="de-DE" sz="1100" dirty="0" smtClean="0"/>
+              <a:rPr lang="de-DE" sz="1100" dirty="0"/>
               <a:t> vorgeschlagene Zeitspanne von 25 Minuten. Stelle Dir einen </a:t>
             </a:r>
             <a:r>
-              <a:rPr lang="de-DE" sz="1100" dirty="0" err="1" smtClean="0"/>
+              <a:rPr lang="de-DE" sz="1100" dirty="0" err="1"/>
               <a:t>Timer</a:t>
             </a:r>
             <a:r>
-              <a:rPr lang="de-DE" sz="1100" dirty="0" smtClean="0"/>
+              <a:rPr lang="de-DE" sz="1100" dirty="0"/>
               <a:t>, übe oder arbeite das, was gerade bei Dir anliegt. </a:t>
             </a:r>
             <a:r>
-              <a:rPr lang="de-DE" sz="1100" smtClean="0"/>
+              <a:rPr lang="de-DE" sz="1100"/>
               <a:t>Notiere Dir, </a:t>
             </a:r>
             <a:r>
-              <a:rPr lang="de-DE" sz="1100" dirty="0" smtClean="0"/>
+              <a:rPr lang="de-DE" sz="1100" dirty="0"/>
               <a:t>nachdem der Wecker geklingelt hat</a:t>
             </a:r>
             <a:r>
-              <a:rPr lang="de-DE" sz="1100" smtClean="0"/>
+              <a:rPr lang="de-DE" sz="1100"/>
               <a:t>, was </a:t>
             </a:r>
             <a:r>
-              <a:rPr lang="de-DE" sz="1100" dirty="0" smtClean="0"/>
+              <a:rPr lang="de-DE" sz="1100" dirty="0"/>
               <a:t>Du geschafft hast.</a:t>
             </a:r>
           </a:p>
           <a:p>
             <a:r>
-              <a:rPr lang="de-DE" sz="1100" dirty="0" smtClean="0"/>
+              <a:rPr lang="de-DE" sz="1100" dirty="0"/>
               <a:t>Für die Zertifizierung dieses </a:t>
             </a:r>
             <a:r>
-              <a:rPr lang="de-DE" sz="1100" dirty="0" err="1" smtClean="0"/>
+              <a:rPr lang="de-DE" sz="1100" dirty="0" err="1"/>
               <a:t>Moves</a:t>
             </a:r>
             <a:r>
-              <a:rPr lang="de-DE" sz="1100" dirty="0" smtClean="0"/>
-              <a:t> brauchst Du in </a:t>
-            </a:r>
-            <a:r>
               <a:rPr lang="de-DE" sz="1100" dirty="0"/>
-              <a:t>2</a:t>
-            </a:r>
-            <a:r>
-              <a:rPr lang="de-DE" sz="1100" dirty="0" smtClean="0"/>
-              <a:t> Wochen 8 Durchführungen dieser Zeitfenster.</a:t>
-            </a:r>
-          </a:p>
-          <a:p>
-            <a:r>
-              <a:rPr lang="de-DE" sz="1100" dirty="0" smtClean="0"/>
+              <a:t> brauchst Du in 2 Wochen 8 Durchführungen dieser Zeitfenster.</a:t>
+            </a:r>
+          </a:p>
+          <a:p>
+            <a:r>
+              <a:rPr lang="de-DE" sz="1100" dirty="0"/>
               <a:t>Teile Deine Dokumentation mit Deinem Team und lass Dir Deine Ergebnisse unterschreiben.</a:t>
             </a:r>
-            <a:endParaRPr lang="de-DE" sz="1100" dirty="0"/>
           </a:p>
         </p:txBody>
       </p:sp>

</xml_diff>